<commit_message>
Removed dashboard due to security concerns
</commit_message>
<xml_diff>
--- a/docs/DemoHLA.pptx
+++ b/docs/DemoHLA.pptx
@@ -197,7 +197,7 @@
           <a:p>
             <a:fld id="{C9DB7F07-F611-493D-A98F-F381480ABA4E}" type="datetimeFigureOut">
               <a:rPr lang="en-US" smtClean="0"/>
-              <a:t>7/6/20</a:t>
+              <a:t>10/1/20</a:t>
             </a:fld>
             <a:endParaRPr lang="en-US"/>
           </a:p>
@@ -8947,64 +8947,6 @@
       </p:cxnSp>
       <p:sp>
         <p:nvSpPr>
-          <p:cNvPr id="22" name="Rounded Rectangle 21">
-            <a:extLst>
-              <a:ext uri="{FF2B5EF4-FFF2-40B4-BE49-F238E27FC236}">
-                <a16:creationId xmlns:a16="http://schemas.microsoft.com/office/drawing/2014/main" id="{1F7A59CA-FEBE-614C-9A3D-D6CC815D0B27}"/>
-              </a:ext>
-            </a:extLst>
-          </p:cNvPr>
-          <p:cNvSpPr/>
-          <p:nvPr/>
-        </p:nvSpPr>
-        <p:spPr>
-          <a:xfrm>
-            <a:off x="9482104" y="7762234"/>
-            <a:ext cx="1962615" cy="1480184"/>
-          </a:xfrm>
-          <a:prstGeom prst="roundRect">
-            <a:avLst/>
-          </a:prstGeom>
-          <a:solidFill>
-            <a:schemeClr val="accent2">
-              <a:lumMod val="40000"/>
-              <a:lumOff val="60000"/>
-            </a:schemeClr>
-          </a:solidFill>
-          <a:ln>
-            <a:noFill/>
-          </a:ln>
-        </p:spPr>
-        <p:style>
-          <a:lnRef idx="2">
-            <a:schemeClr val="accent1">
-              <a:shade val="50000"/>
-            </a:schemeClr>
-          </a:lnRef>
-          <a:fillRef idx="1">
-            <a:schemeClr val="accent1"/>
-          </a:fillRef>
-          <a:effectRef idx="0">
-            <a:schemeClr val="accent1"/>
-          </a:effectRef>
-          <a:fontRef idx="minor">
-            <a:schemeClr val="lt1"/>
-          </a:fontRef>
-        </p:style>
-        <p:txBody>
-          <a:bodyPr rtlCol="0" anchor="ctr"/>
-          <a:lstStyle/>
-          <a:p>
-            <a:pPr algn="ctr"/>
-            <a:r>
-              <a:rPr lang="en-US" sz="2800" dirty="0"/>
-              <a:t>Dash-board</a:t>
-            </a:r>
-          </a:p>
-        </p:txBody>
-      </p:sp>
-      <p:sp>
-        <p:nvSpPr>
           <p:cNvPr id="28" name="Can 27">
             <a:extLst>
               <a:ext uri="{FF2B5EF4-FFF2-40B4-BE49-F238E27FC236}">
@@ -9162,8 +9104,8 @@
         </p:nvSpPr>
         <p:spPr>
           <a:xfrm>
-            <a:off x="11648756" y="7762234"/>
-            <a:ext cx="1962615" cy="1424957"/>
+            <a:off x="9482106" y="7762234"/>
+            <a:ext cx="4129266" cy="1424957"/>
           </a:xfrm>
           <a:prstGeom prst="roundRect">
             <a:avLst/>

</xml_diff>